<commit_message>
update for new data
</commit_message>
<xml_diff>
--- a/3.24 - 4.05/Zusammenfassung.pptx
+++ b/3.24 - 4.05/Zusammenfassung.pptx
@@ -6,7 +6,7 @@
     <p:sldMasterId id="2147483661" r:id="rId2"/>
   </p:sldMasterIdLst>
   <p:notesMasterIdLst>
-    <p:notesMasterId r:id="rId10"/>
+    <p:notesMasterId r:id="rId11"/>
   </p:notesMasterIdLst>
   <p:sldIdLst>
     <p:sldId id="256" r:id="rId3"/>
@@ -16,6 +16,7 @@
     <p:sldId id="259" r:id="rId7"/>
     <p:sldId id="260" r:id="rId8"/>
     <p:sldId id="262" r:id="rId9"/>
+    <p:sldId id="263" r:id="rId10"/>
   </p:sldIdLst>
   <p:sldSz cx="12192000" cy="6858000"/>
   <p:notesSz cx="6858000" cy="9144000"/>
@@ -8598,12 +8599,94 @@
           </a:p>
         </p:txBody>
       </p:sp>
+      <p:sp>
+        <p:nvSpPr>
+          <p:cNvPr id="10" name="TextShape 1">
+            <a:extLst>
+              <a:ext uri="{FF2B5EF4-FFF2-40B4-BE49-F238E27FC236}">
+                <a16:creationId xmlns:a16="http://schemas.microsoft.com/office/drawing/2014/main" id="{75439AD1-B68F-4BA5-8AB2-C87B29D01E43}"/>
+              </a:ext>
+            </a:extLst>
+          </p:cNvPr>
+          <p:cNvSpPr txBox="1"/>
+          <p:nvPr/>
+        </p:nvSpPr>
+        <p:spPr>
+          <a:xfrm>
+            <a:off x="291645" y="1117697"/>
+            <a:ext cx="11124720" cy="4485960"/>
+          </a:xfrm>
+          <a:prstGeom prst="rect">
+            <a:avLst/>
+          </a:prstGeom>
+          <a:noFill/>
+          <a:ln>
+            <a:noFill/>
+          </a:ln>
+        </p:spPr>
+        <p:txBody>
+          <a:bodyPr lIns="0" tIns="0" rIns="0" bIns="0">
+            <a:normAutofit/>
+          </a:bodyPr>
+          <a:lstStyle/>
+          <a:p>
+            <a:pPr marL="271440" indent="-271080">
+              <a:lnSpc>
+                <a:spcPct val="150000"/>
+              </a:lnSpc>
+              <a:spcBef>
+                <a:spcPts val="1199"/>
+              </a:spcBef>
+              <a:buSzPct val="100000"/>
+              <a:buBlip>
+                <a:blip r:embed="rId2"/>
+              </a:buBlip>
+            </a:pPr>
+            <a:r>
+              <a:rPr lang="en-US" sz="2200" spc="-1" dirty="0" err="1">
+                <a:solidFill>
+                  <a:srgbClr val="000000"/>
+                </a:solidFill>
+                <a:latin typeface="Arial"/>
+              </a:rPr>
+              <a:t>Ganzer</a:t>
+            </a:r>
+            <a:r>
+              <a:rPr lang="en-US" sz="2200" spc="-1" dirty="0">
+                <a:solidFill>
+                  <a:srgbClr val="000000"/>
+                </a:solidFill>
+                <a:latin typeface="Arial"/>
+              </a:rPr>
+              <a:t> </a:t>
+            </a:r>
+            <a:r>
+              <a:rPr lang="en-US" sz="2200" spc="-1" dirty="0" err="1">
+                <a:solidFill>
+                  <a:srgbClr val="000000"/>
+                </a:solidFill>
+                <a:latin typeface="Arial"/>
+              </a:rPr>
+              <a:t>Prozess</a:t>
+            </a:r>
+            <a:r>
+              <a:rPr lang="en-US" sz="2200" spc="-1" dirty="0">
+                <a:solidFill>
+                  <a:srgbClr val="000000"/>
+                </a:solidFill>
+                <a:latin typeface="Arial"/>
+              </a:rPr>
+              <a:t>:</a:t>
+            </a:r>
+          </a:p>
+        </p:txBody>
+      </p:sp>
       <p:pic>
         <p:nvPicPr>
-          <p:cNvPr id="5" name="图片 4" descr="图形用户界面&#10;&#10;描述已自动生成">
+          <p:cNvPr id="11" name="图片 10" descr="文本&#10;&#10;描述已自动生成">
             <a:extLst>
               <a:ext uri="{FF2B5EF4-FFF2-40B4-BE49-F238E27FC236}">
-                <a16:creationId xmlns:a16="http://schemas.microsoft.com/office/drawing/2014/main" id="{C580F614-2D09-44FB-9A6E-941EB0DD25C2}"/>
+                <a16:creationId xmlns:a16="http://schemas.microsoft.com/office/drawing/2014/main" id="{C847BB5F-CB0A-4146-A322-A826AA876032}"/>
               </a:ext>
             </a:extLst>
           </p:cNvPr>
@@ -8613,7 +8696,7 @@
           <p:nvPr/>
         </p:nvPicPr>
         <p:blipFill>
-          <a:blip r:embed="rId2">
+          <a:blip r:embed="rId3">
             <a:extLst>
               <a:ext uri="{28A0092B-C50C-407E-A947-70E740481C1C}">
                 <a14:useLocalDpi xmlns:a14="http://schemas.microsoft.com/office/drawing/2010/main" val="0"/>
@@ -8626,102 +8709,237 @@
         </p:blipFill>
         <p:spPr>
           <a:xfrm>
-            <a:off x="288000" y="3613303"/>
-            <a:ext cx="6962582" cy="2643629"/>
+            <a:off x="288000" y="1659172"/>
+            <a:ext cx="2985922" cy="1447165"/>
           </a:xfrm>
           <a:prstGeom prst="rect">
             <a:avLst/>
           </a:prstGeom>
         </p:spPr>
       </p:pic>
-      <p:sp>
-        <p:nvSpPr>
-          <p:cNvPr id="10" name="TextShape 1">
+      <p:cxnSp>
+        <p:nvCxnSpPr>
+          <p:cNvPr id="7" name="直接箭头连接符 6">
             <a:extLst>
               <a:ext uri="{FF2B5EF4-FFF2-40B4-BE49-F238E27FC236}">
-                <a16:creationId xmlns:a16="http://schemas.microsoft.com/office/drawing/2014/main" id="{75439AD1-B68F-4BA5-8AB2-C87B29D01E43}"/>
+                <a16:creationId xmlns:a16="http://schemas.microsoft.com/office/drawing/2014/main" id="{07C845EC-5E9F-46CD-8BA0-A80A24FDEC3C}"/>
               </a:ext>
             </a:extLst>
           </p:cNvPr>
-          <p:cNvSpPr txBox="1"/>
+          <p:cNvCxnSpPr/>
           <p:nvPr/>
-        </p:nvSpPr>
-        <p:spPr>
-          <a:xfrm>
-            <a:off x="291645" y="1117697"/>
-            <a:ext cx="11124720" cy="4485960"/>
-          </a:xfrm>
-          <a:prstGeom prst="rect">
-            <a:avLst/>
-          </a:prstGeom>
-          <a:noFill/>
+        </p:nvCxnSpPr>
+        <p:spPr>
+          <a:xfrm>
+            <a:off x="3393649" y="2382754"/>
+            <a:ext cx="2262433" cy="0"/>
+          </a:xfrm>
+          <a:prstGeom prst="straightConnector1">
+            <a:avLst/>
+          </a:prstGeom>
           <a:ln>
-            <a:noFill/>
+            <a:solidFill>
+              <a:schemeClr val="tx1"/>
+            </a:solidFill>
+            <a:tailEnd type="triangle"/>
           </a:ln>
         </p:spPr>
-        <p:txBody>
-          <a:bodyPr lIns="0" tIns="0" rIns="0" bIns="0">
-            <a:normAutofit/>
-          </a:bodyPr>
-          <a:lstStyle/>
-          <a:p>
-            <a:pPr marL="271440" indent="-271080">
-              <a:lnSpc>
-                <a:spcPct val="150000"/>
-              </a:lnSpc>
-              <a:spcBef>
-                <a:spcPts val="1199"/>
-              </a:spcBef>
-              <a:buSzPct val="100000"/>
-              <a:buBlip>
-                <a:blip r:embed="rId3"/>
-              </a:buBlip>
-            </a:pPr>
-            <a:r>
-              <a:rPr lang="en-US" sz="2200" spc="-1" dirty="0" err="1">
-                <a:solidFill>
-                  <a:srgbClr val="000000"/>
-                </a:solidFill>
-                <a:latin typeface="Arial"/>
-              </a:rPr>
-              <a:t>Ganzer</a:t>
-            </a:r>
-            <a:r>
-              <a:rPr lang="en-US" sz="2200" spc="-1" dirty="0">
-                <a:solidFill>
-                  <a:srgbClr val="000000"/>
-                </a:solidFill>
-                <a:latin typeface="Arial"/>
-              </a:rPr>
+        <p:style>
+          <a:lnRef idx="1">
+            <a:schemeClr val="accent1"/>
+          </a:lnRef>
+          <a:fillRef idx="0">
+            <a:schemeClr val="accent1"/>
+          </a:fillRef>
+          <a:effectRef idx="0">
+            <a:schemeClr val="accent1"/>
+          </a:effectRef>
+          <a:fontRef idx="minor">
+            <a:schemeClr val="tx1"/>
+          </a:fontRef>
+        </p:style>
+      </p:cxnSp>
+      <p:sp>
+        <p:nvSpPr>
+          <p:cNvPr id="8" name="矩形 7">
+            <a:extLst>
+              <a:ext uri="{FF2B5EF4-FFF2-40B4-BE49-F238E27FC236}">
+                <a16:creationId xmlns:a16="http://schemas.microsoft.com/office/drawing/2014/main" id="{9ED7C1CE-4BA8-4D24-AF90-D2A8232BE394}"/>
+              </a:ext>
+            </a:extLst>
+          </p:cNvPr>
+          <p:cNvSpPr/>
+          <p:nvPr/>
+        </p:nvSpPr>
+        <p:spPr>
+          <a:xfrm>
+            <a:off x="3563332" y="2103149"/>
+            <a:ext cx="1772239" cy="245097"/>
+          </a:xfrm>
+          <a:prstGeom prst="rect">
+            <a:avLst/>
+          </a:prstGeom>
+          <a:solidFill>
+            <a:schemeClr val="bg1"/>
+          </a:solidFill>
+          <a:ln>
+            <a:solidFill>
+              <a:schemeClr val="bg1"/>
+            </a:solidFill>
+          </a:ln>
+        </p:spPr>
+        <p:style>
+          <a:lnRef idx="2">
+            <a:schemeClr val="dk1"/>
+          </a:lnRef>
+          <a:fillRef idx="1">
+            <a:schemeClr val="lt1"/>
+          </a:fillRef>
+          <a:effectRef idx="0">
+            <a:schemeClr val="dk1"/>
+          </a:effectRef>
+          <a:fontRef idx="minor">
+            <a:schemeClr val="dk1"/>
+          </a:fontRef>
+        </p:style>
+        <p:txBody>
+          <a:bodyPr rtlCol="0" anchor="ctr"/>
+          <a:lstStyle/>
+          <a:p>
+            <a:pPr algn="ctr"/>
+            <a:r>
+              <a:rPr lang="de-DE" sz="1400" dirty="0" err="1"/>
+              <a:t>Blif_parser</a:t>
+            </a:r>
+            <a:endParaRPr lang="de-DE" sz="1400" dirty="0"/>
+          </a:p>
+        </p:txBody>
+      </p:sp>
+      <p:cxnSp>
+        <p:nvCxnSpPr>
+          <p:cNvPr id="20" name="连接符: 肘形 19">
+            <a:extLst>
+              <a:ext uri="{FF2B5EF4-FFF2-40B4-BE49-F238E27FC236}">
+                <a16:creationId xmlns:a16="http://schemas.microsoft.com/office/drawing/2014/main" id="{AB2AB3A2-BECB-4D73-B1D2-BD09EAB5D94A}"/>
+              </a:ext>
+            </a:extLst>
+          </p:cNvPr>
+          <p:cNvCxnSpPr>
+            <a:cxnSpLocks/>
+            <a:stCxn id="3" idx="3"/>
+          </p:cNvCxnSpPr>
+          <p:nvPr/>
+        </p:nvCxnSpPr>
+        <p:spPr>
+          <a:xfrm flipH="1">
+            <a:off x="7362334" y="2332677"/>
+            <a:ext cx="3244704" cy="2602440"/>
+          </a:xfrm>
+          <a:prstGeom prst="bentConnector3">
+            <a:avLst>
+              <a:gd name="adj1" fmla="val -7045"/>
+            </a:avLst>
+          </a:prstGeom>
+          <a:ln>
+            <a:solidFill>
+              <a:schemeClr val="tx1"/>
+            </a:solidFill>
+            <a:tailEnd type="triangle"/>
+          </a:ln>
+        </p:spPr>
+        <p:style>
+          <a:lnRef idx="1">
+            <a:schemeClr val="accent1"/>
+          </a:lnRef>
+          <a:fillRef idx="0">
+            <a:schemeClr val="accent1"/>
+          </a:fillRef>
+          <a:effectRef idx="0">
+            <a:schemeClr val="accent1"/>
+          </a:effectRef>
+          <a:fontRef idx="minor">
+            <a:schemeClr val="tx1"/>
+          </a:fontRef>
+        </p:style>
+      </p:cxnSp>
+      <p:sp>
+        <p:nvSpPr>
+          <p:cNvPr id="26" name="矩形 25">
+            <a:extLst>
+              <a:ext uri="{FF2B5EF4-FFF2-40B4-BE49-F238E27FC236}">
+                <a16:creationId xmlns:a16="http://schemas.microsoft.com/office/drawing/2014/main" id="{5411AEE9-4D21-40E5-8B68-B51E8D0C17D5}"/>
+              </a:ext>
+            </a:extLst>
+          </p:cNvPr>
+          <p:cNvSpPr/>
+          <p:nvPr/>
+        </p:nvSpPr>
+        <p:spPr>
+          <a:xfrm>
+            <a:off x="8098566" y="4602823"/>
+            <a:ext cx="1772239" cy="245097"/>
+          </a:xfrm>
+          <a:prstGeom prst="rect">
+            <a:avLst/>
+          </a:prstGeom>
+          <a:solidFill>
+            <a:schemeClr val="bg1"/>
+          </a:solidFill>
+          <a:ln>
+            <a:solidFill>
+              <a:schemeClr val="bg1"/>
+            </a:solidFill>
+          </a:ln>
+        </p:spPr>
+        <p:style>
+          <a:lnRef idx="2">
+            <a:schemeClr val="dk1"/>
+          </a:lnRef>
+          <a:fillRef idx="1">
+            <a:schemeClr val="lt1"/>
+          </a:fillRef>
+          <a:effectRef idx="0">
+            <a:schemeClr val="dk1"/>
+          </a:effectRef>
+          <a:fontRef idx="minor">
+            <a:schemeClr val="dk1"/>
+          </a:fontRef>
+        </p:style>
+        <p:txBody>
+          <a:bodyPr rtlCol="0" anchor="ctr"/>
+          <a:lstStyle/>
+          <a:p>
+            <a:pPr algn="ctr"/>
+            <a:r>
+              <a:rPr lang="de-DE" sz="1400" dirty="0" err="1"/>
+              <a:t>Yosys</a:t>
+            </a:r>
+            <a:r>
+              <a:rPr lang="de-DE" sz="1400" dirty="0"/>
               <a:t> </a:t>
             </a:r>
             <a:r>
-              <a:rPr lang="en-US" sz="2200" spc="-1" dirty="0" err="1">
-                <a:solidFill>
-                  <a:srgbClr val="000000"/>
-                </a:solidFill>
-                <a:latin typeface="Arial"/>
-              </a:rPr>
-              <a:t>Prozess</a:t>
-            </a:r>
-            <a:r>
-              <a:rPr lang="en-US" sz="2200" spc="-1" dirty="0">
-                <a:solidFill>
-                  <a:srgbClr val="000000"/>
-                </a:solidFill>
-                <a:latin typeface="Arial"/>
-              </a:rPr>
-              <a:t>:</a:t>
-            </a:r>
+              <a:rPr lang="de-DE" sz="1400" dirty="0" err="1"/>
+              <a:t>to</a:t>
+            </a:r>
+            <a:r>
+              <a:rPr lang="de-DE" sz="1400" dirty="0"/>
+              <a:t> </a:t>
+            </a:r>
+            <a:r>
+              <a:rPr lang="de-DE" sz="1400" dirty="0" err="1"/>
+              <a:t>Verilog</a:t>
+            </a:r>
+            <a:endParaRPr lang="de-DE" sz="1400" dirty="0"/>
           </a:p>
         </p:txBody>
       </p:sp>
       <p:pic>
         <p:nvPicPr>
-          <p:cNvPr id="11" name="图片 10" descr="文本&#10;&#10;描述已自动生成">
+          <p:cNvPr id="3" name="图片 2" descr="文本&#10;&#10;描述已自动生成">
             <a:extLst>
               <a:ext uri="{FF2B5EF4-FFF2-40B4-BE49-F238E27FC236}">
-                <a16:creationId xmlns:a16="http://schemas.microsoft.com/office/drawing/2014/main" id="{C847BB5F-CB0A-4146-A322-A826AA876032}"/>
+                <a16:creationId xmlns:a16="http://schemas.microsoft.com/office/drawing/2014/main" id="{15378797-0CE7-4869-932E-3F734107AA45}"/>
               </a:ext>
             </a:extLst>
           </p:cNvPr>
@@ -8744,118 +8962,20 @@
         </p:blipFill>
         <p:spPr>
           <a:xfrm>
-            <a:off x="288000" y="1659172"/>
-            <a:ext cx="2985922" cy="1447165"/>
+            <a:off x="5656082" y="1514606"/>
+            <a:ext cx="4950956" cy="1636141"/>
           </a:xfrm>
           <a:prstGeom prst="rect">
             <a:avLst/>
           </a:prstGeom>
         </p:spPr>
       </p:pic>
-      <p:cxnSp>
-        <p:nvCxnSpPr>
-          <p:cNvPr id="7" name="直接箭头连接符 6">
+      <p:pic>
+        <p:nvPicPr>
+          <p:cNvPr id="17" name="图片 16" descr="电脑萤幕画面&#10;&#10;中度可信度描述已自动生成">
             <a:extLst>
               <a:ext uri="{FF2B5EF4-FFF2-40B4-BE49-F238E27FC236}">
-                <a16:creationId xmlns:a16="http://schemas.microsoft.com/office/drawing/2014/main" id="{07C845EC-5E9F-46CD-8BA0-A80A24FDEC3C}"/>
-              </a:ext>
-            </a:extLst>
-          </p:cNvPr>
-          <p:cNvCxnSpPr/>
-          <p:nvPr/>
-        </p:nvCxnSpPr>
-        <p:spPr>
-          <a:xfrm>
-            <a:off x="3393649" y="2382754"/>
-            <a:ext cx="2262433" cy="0"/>
-          </a:xfrm>
-          <a:prstGeom prst="straightConnector1">
-            <a:avLst/>
-          </a:prstGeom>
-          <a:ln>
-            <a:solidFill>
-              <a:schemeClr val="tx1"/>
-            </a:solidFill>
-            <a:tailEnd type="triangle"/>
-          </a:ln>
-        </p:spPr>
-        <p:style>
-          <a:lnRef idx="1">
-            <a:schemeClr val="accent1"/>
-          </a:lnRef>
-          <a:fillRef idx="0">
-            <a:schemeClr val="accent1"/>
-          </a:fillRef>
-          <a:effectRef idx="0">
-            <a:schemeClr val="accent1"/>
-          </a:effectRef>
-          <a:fontRef idx="minor">
-            <a:schemeClr val="tx1"/>
-          </a:fontRef>
-        </p:style>
-      </p:cxnSp>
-      <p:sp>
-        <p:nvSpPr>
-          <p:cNvPr id="8" name="矩形 7">
-            <a:extLst>
-              <a:ext uri="{FF2B5EF4-FFF2-40B4-BE49-F238E27FC236}">
-                <a16:creationId xmlns:a16="http://schemas.microsoft.com/office/drawing/2014/main" id="{9ED7C1CE-4BA8-4D24-AF90-D2A8232BE394}"/>
-              </a:ext>
-            </a:extLst>
-          </p:cNvPr>
-          <p:cNvSpPr/>
-          <p:nvPr/>
-        </p:nvSpPr>
-        <p:spPr>
-          <a:xfrm>
-            <a:off x="3563332" y="2103149"/>
-            <a:ext cx="1772239" cy="245097"/>
-          </a:xfrm>
-          <a:prstGeom prst="rect">
-            <a:avLst/>
-          </a:prstGeom>
-          <a:solidFill>
-            <a:schemeClr val="bg1"/>
-          </a:solidFill>
-          <a:ln>
-            <a:solidFill>
-              <a:schemeClr val="bg1"/>
-            </a:solidFill>
-          </a:ln>
-        </p:spPr>
-        <p:style>
-          <a:lnRef idx="2">
-            <a:schemeClr val="dk1"/>
-          </a:lnRef>
-          <a:fillRef idx="1">
-            <a:schemeClr val="lt1"/>
-          </a:fillRef>
-          <a:effectRef idx="0">
-            <a:schemeClr val="dk1"/>
-          </a:effectRef>
-          <a:fontRef idx="minor">
-            <a:schemeClr val="dk1"/>
-          </a:fontRef>
-        </p:style>
-        <p:txBody>
-          <a:bodyPr rtlCol="0" anchor="ctr"/>
-          <a:lstStyle/>
-          <a:p>
-            <a:pPr algn="ctr"/>
-            <a:r>
-              <a:rPr lang="de-DE" sz="1400" dirty="0" err="1"/>
-              <a:t>Blif_parser</a:t>
-            </a:r>
-            <a:endParaRPr lang="de-DE" sz="1400" dirty="0"/>
-          </a:p>
-        </p:txBody>
-      </p:sp>
-      <p:pic>
-        <p:nvPicPr>
-          <p:cNvPr id="12" name="图片 11" descr="文本&#10;&#10;描述已自动生成">
-            <a:extLst>
-              <a:ext uri="{FF2B5EF4-FFF2-40B4-BE49-F238E27FC236}">
-                <a16:creationId xmlns:a16="http://schemas.microsoft.com/office/drawing/2014/main" id="{63937EF8-EF86-4B80-B153-EA9A8C978EFF}"/>
+                <a16:creationId xmlns:a16="http://schemas.microsoft.com/office/drawing/2014/main" id="{FDA2B53D-026A-415E-9D6F-FC51A3E38EB3}"/>
               </a:ext>
             </a:extLst>
           </p:cNvPr>
@@ -8878,137 +8998,1043 @@
         </p:blipFill>
         <p:spPr>
           <a:xfrm>
-            <a:off x="5624981" y="1659172"/>
-            <a:ext cx="4982057" cy="1489127"/>
+            <a:off x="224871" y="4156850"/>
+            <a:ext cx="7137462" cy="1653199"/>
           </a:xfrm>
           <a:prstGeom prst="rect">
             <a:avLst/>
           </a:prstGeom>
         </p:spPr>
       </p:pic>
-      <p:cxnSp>
-        <p:nvCxnSpPr>
-          <p:cNvPr id="20" name="连接符: 肘形 19">
-            <a:extLst>
-              <a:ext uri="{FF2B5EF4-FFF2-40B4-BE49-F238E27FC236}">
-                <a16:creationId xmlns:a16="http://schemas.microsoft.com/office/drawing/2014/main" id="{AB2AB3A2-BECB-4D73-B1D2-BD09EAB5D94A}"/>
-              </a:ext>
-            </a:extLst>
-          </p:cNvPr>
-          <p:cNvCxnSpPr>
-            <a:cxnSpLocks/>
-            <a:stCxn id="12" idx="3"/>
-          </p:cNvCxnSpPr>
-          <p:nvPr/>
-        </p:nvCxnSpPr>
-        <p:spPr>
-          <a:xfrm flipH="1">
-            <a:off x="7362334" y="2403736"/>
-            <a:ext cx="3244704" cy="2531381"/>
-          </a:xfrm>
-          <a:prstGeom prst="bentConnector3">
-            <a:avLst>
-              <a:gd name="adj1" fmla="val -7045"/>
-            </a:avLst>
-          </a:prstGeom>
-          <a:ln>
-            <a:solidFill>
-              <a:schemeClr val="tx1"/>
-            </a:solidFill>
-            <a:tailEnd type="triangle"/>
-          </a:ln>
-        </p:spPr>
-        <p:style>
-          <a:lnRef idx="1">
-            <a:schemeClr val="accent1"/>
-          </a:lnRef>
-          <a:fillRef idx="0">
-            <a:schemeClr val="accent1"/>
-          </a:fillRef>
-          <a:effectRef idx="0">
-            <a:schemeClr val="accent1"/>
-          </a:effectRef>
-          <a:fontRef idx="minor">
-            <a:schemeClr val="tx1"/>
-          </a:fontRef>
-        </p:style>
-      </p:cxnSp>
-      <p:sp>
-        <p:nvSpPr>
-          <p:cNvPr id="26" name="矩形 25">
-            <a:extLst>
-              <a:ext uri="{FF2B5EF4-FFF2-40B4-BE49-F238E27FC236}">
-                <a16:creationId xmlns:a16="http://schemas.microsoft.com/office/drawing/2014/main" id="{5411AEE9-4D21-40E5-8B68-B51E8D0C17D5}"/>
-              </a:ext>
-            </a:extLst>
-          </p:cNvPr>
-          <p:cNvSpPr/>
-          <p:nvPr/>
-        </p:nvSpPr>
-        <p:spPr>
-          <a:xfrm>
-            <a:off x="8098566" y="4602823"/>
-            <a:ext cx="1772239" cy="245097"/>
-          </a:xfrm>
-          <a:prstGeom prst="rect">
-            <a:avLst/>
-          </a:prstGeom>
-          <a:solidFill>
-            <a:schemeClr val="bg1"/>
-          </a:solidFill>
-          <a:ln>
-            <a:solidFill>
-              <a:schemeClr val="bg1"/>
-            </a:solidFill>
-          </a:ln>
-        </p:spPr>
-        <p:style>
-          <a:lnRef idx="2">
-            <a:schemeClr val="dk1"/>
-          </a:lnRef>
-          <a:fillRef idx="1">
-            <a:schemeClr val="lt1"/>
-          </a:fillRef>
-          <a:effectRef idx="0">
-            <a:schemeClr val="dk1"/>
-          </a:effectRef>
-          <a:fontRef idx="minor">
-            <a:schemeClr val="dk1"/>
-          </a:fontRef>
-        </p:style>
-        <p:txBody>
-          <a:bodyPr rtlCol="0" anchor="ctr"/>
-          <a:lstStyle/>
-          <a:p>
-            <a:pPr algn="ctr"/>
-            <a:r>
-              <a:rPr lang="de-DE" sz="1400" dirty="0" err="1"/>
-              <a:t>Yosys</a:t>
-            </a:r>
-            <a:r>
-              <a:rPr lang="de-DE" sz="1400" dirty="0"/>
-              <a:t> </a:t>
-            </a:r>
-            <a:r>
-              <a:rPr lang="de-DE" sz="1400" dirty="0" err="1"/>
-              <a:t>to</a:t>
-            </a:r>
-            <a:r>
-              <a:rPr lang="de-DE" sz="1400" dirty="0"/>
-              <a:t> </a:t>
-            </a:r>
-            <a:r>
-              <a:rPr lang="de-DE" sz="1400" dirty="0" err="1"/>
-              <a:t>Verilog</a:t>
-            </a:r>
-            <a:endParaRPr lang="de-DE" sz="1400" dirty="0"/>
-          </a:p>
-        </p:txBody>
-      </p:sp>
     </p:spTree>
     <p:extLst>
       <p:ext uri="{BB962C8B-B14F-4D97-AF65-F5344CB8AC3E}">
         <p14:creationId xmlns:p14="http://schemas.microsoft.com/office/powerpoint/2010/main" val="4241626020"/>
+      </p:ext>
+    </p:extLst>
+  </p:cSld>
+  <p:clrMapOvr>
+    <a:masterClrMapping/>
+  </p:clrMapOvr>
+</p:sld>
+</file>
+
+<file path=ppt/slides/slide8.xml><?xml version="1.0" encoding="utf-8"?>
+<p:sld xmlns:a="http://schemas.openxmlformats.org/drawingml/2006/main" xmlns:r="http://schemas.openxmlformats.org/officeDocument/2006/relationships" xmlns:p="http://schemas.openxmlformats.org/presentationml/2006/main">
+  <p:cSld>
+    <p:spTree>
+      <p:nvGrpSpPr>
+        <p:cNvPr id="1" name=""/>
+        <p:cNvGrpSpPr/>
+        <p:nvPr/>
+      </p:nvGrpSpPr>
+      <p:grpSpPr>
+        <a:xfrm>
+          <a:off x="0" y="0"/>
+          <a:ext cx="0" cy="0"/>
+          <a:chOff x="0" y="0"/>
+          <a:chExt cx="0" cy="0"/>
+        </a:xfrm>
+      </p:grpSpPr>
+      <p:sp>
+        <p:nvSpPr>
+          <p:cNvPr id="133" name="TextShape 2"/>
+          <p:cNvSpPr txBox="1"/>
+          <p:nvPr/>
+        </p:nvSpPr>
+        <p:spPr>
+          <a:xfrm>
+            <a:off x="836280" y="6329880"/>
+            <a:ext cx="1370160" cy="527760"/>
+          </a:xfrm>
+          <a:prstGeom prst="rect">
+            <a:avLst/>
+          </a:prstGeom>
+          <a:noFill/>
+          <a:ln>
+            <a:noFill/>
+          </a:ln>
+        </p:spPr>
+        <p:txBody>
+          <a:bodyPr lIns="0" tIns="0" rIns="0" bIns="0" anchor="ctr">
+            <a:noAutofit/>
+          </a:bodyPr>
+          <a:lstStyle/>
+          <a:p>
+            <a:pPr>
+              <a:lnSpc>
+                <a:spcPct val="100000"/>
+              </a:lnSpc>
+            </a:pPr>
+            <a:fld id="{1EBBCA0A-B98A-4A1E-ACD5-F40A4E1EAE71}" type="datetime">
+              <a:rPr lang="en-US" sz="1200" b="0" strike="noStrike" spc="-1">
+                <a:solidFill>
+                  <a:srgbClr val="000000"/>
+                </a:solidFill>
+                <a:latin typeface="Arial"/>
+              </a:rPr>
+              <a:t>4/3/2022</a:t>
+            </a:fld>
+            <a:endParaRPr lang="en-US" sz="1200" b="0" strike="noStrike" spc="-1">
+              <a:latin typeface="Times New Roman"/>
+            </a:endParaRPr>
+          </a:p>
+        </p:txBody>
+      </p:sp>
+      <p:sp>
+        <p:nvSpPr>
+          <p:cNvPr id="134" name="TextShape 3"/>
+          <p:cNvSpPr txBox="1"/>
+          <p:nvPr/>
+        </p:nvSpPr>
+        <p:spPr>
+          <a:xfrm>
+            <a:off x="288000" y="6329880"/>
+            <a:ext cx="434880" cy="527760"/>
+          </a:xfrm>
+          <a:prstGeom prst="rect">
+            <a:avLst/>
+          </a:prstGeom>
+          <a:noFill/>
+          <a:ln>
+            <a:noFill/>
+          </a:ln>
+        </p:spPr>
+        <p:txBody>
+          <a:bodyPr lIns="0" tIns="0" rIns="0" bIns="0" anchor="ctr">
+            <a:noAutofit/>
+          </a:bodyPr>
+          <a:lstStyle/>
+          <a:p>
+            <a:pPr>
+              <a:lnSpc>
+                <a:spcPct val="100000"/>
+              </a:lnSpc>
+            </a:pPr>
+            <a:fld id="{E97E6E00-B625-4A30-BFF8-96DE90A18A9A}" type="slidenum">
+              <a:rPr lang="en-US" sz="1200" b="1" strike="noStrike" spc="-1">
+                <a:solidFill>
+                  <a:srgbClr val="000000"/>
+                </a:solidFill>
+                <a:latin typeface="Arial"/>
+              </a:rPr>
+              <a:t>8</a:t>
+            </a:fld>
+            <a:endParaRPr lang="en-US" sz="1200" b="0" strike="noStrike" spc="-1">
+              <a:latin typeface="Times New Roman"/>
+            </a:endParaRPr>
+          </a:p>
+        </p:txBody>
+      </p:sp>
+      <p:sp>
+        <p:nvSpPr>
+          <p:cNvPr id="135" name="TextShape 4"/>
+          <p:cNvSpPr txBox="1"/>
+          <p:nvPr/>
+        </p:nvSpPr>
+        <p:spPr>
+          <a:xfrm>
+            <a:off x="505440" y="203093"/>
+            <a:ext cx="9158400" cy="767520"/>
+          </a:xfrm>
+          <a:prstGeom prst="rect">
+            <a:avLst/>
+          </a:prstGeom>
+          <a:noFill/>
+          <a:ln>
+            <a:noFill/>
+          </a:ln>
+        </p:spPr>
+        <p:txBody>
+          <a:bodyPr lIns="0" tIns="0" rIns="0" bIns="0" anchor="b">
+            <a:noAutofit/>
+          </a:bodyPr>
+          <a:lstStyle/>
+          <a:p>
+            <a:pPr>
+              <a:lnSpc>
+                <a:spcPct val="90000"/>
+              </a:lnSpc>
+            </a:pPr>
+            <a:r>
+              <a:rPr lang="de-DE" sz="3200" b="1" spc="-1" dirty="0">
+                <a:solidFill>
+                  <a:srgbClr val="000000"/>
+                </a:solidFill>
+                <a:latin typeface="Arial"/>
+              </a:rPr>
+              <a:t>Zukünftige Arbeit</a:t>
+            </a:r>
+            <a:endParaRPr lang="en-US" sz="3200" b="0" strike="noStrike" spc="-1" dirty="0">
+              <a:solidFill>
+                <a:srgbClr val="000000"/>
+              </a:solidFill>
+              <a:latin typeface="Arial"/>
+            </a:endParaRPr>
+          </a:p>
+        </p:txBody>
+      </p:sp>
+      <p:sp>
+        <p:nvSpPr>
+          <p:cNvPr id="10" name="TextShape 1">
+            <a:extLst>
+              <a:ext uri="{FF2B5EF4-FFF2-40B4-BE49-F238E27FC236}">
+                <a16:creationId xmlns:a16="http://schemas.microsoft.com/office/drawing/2014/main" id="{75439AD1-B68F-4BA5-8AB2-C87B29D01E43}"/>
+              </a:ext>
+            </a:extLst>
+          </p:cNvPr>
+          <p:cNvSpPr txBox="1"/>
+          <p:nvPr/>
+        </p:nvSpPr>
+        <p:spPr>
+          <a:xfrm>
+            <a:off x="291645" y="1117697"/>
+            <a:ext cx="11124720" cy="4485960"/>
+          </a:xfrm>
+          <a:prstGeom prst="rect">
+            <a:avLst/>
+          </a:prstGeom>
+          <a:noFill/>
+          <a:ln>
+            <a:noFill/>
+          </a:ln>
+        </p:spPr>
+        <p:txBody>
+          <a:bodyPr lIns="0" tIns="0" rIns="0" bIns="0">
+            <a:normAutofit/>
+          </a:bodyPr>
+          <a:lstStyle/>
+          <a:p>
+            <a:pPr marL="271440" indent="-271080">
+              <a:lnSpc>
+                <a:spcPct val="150000"/>
+              </a:lnSpc>
+              <a:spcBef>
+                <a:spcPts val="1199"/>
+              </a:spcBef>
+              <a:buSzPct val="100000"/>
+              <a:buBlip>
+                <a:blip r:embed="rId2"/>
+              </a:buBlip>
+            </a:pPr>
+            <a:r>
+              <a:rPr lang="en-US" sz="2200" spc="-1" dirty="0">
+                <a:solidFill>
+                  <a:srgbClr val="000000"/>
+                </a:solidFill>
+                <a:latin typeface="Arial"/>
+              </a:rPr>
+              <a:t>Die </a:t>
+            </a:r>
+            <a:r>
+              <a:rPr lang="en-US" sz="2200" spc="-1" dirty="0" err="1">
+                <a:solidFill>
+                  <a:srgbClr val="000000"/>
+                </a:solidFill>
+                <a:latin typeface="Arial"/>
+              </a:rPr>
+              <a:t>Probleme</a:t>
+            </a:r>
+            <a:r>
+              <a:rPr lang="en-US" sz="2200" spc="-1" dirty="0">
+                <a:solidFill>
+                  <a:srgbClr val="000000"/>
+                </a:solidFill>
+                <a:latin typeface="Arial"/>
+              </a:rPr>
+              <a:t> auf der </a:t>
+            </a:r>
+            <a:r>
+              <a:rPr lang="en-US" sz="2200" spc="-1" dirty="0" err="1">
+                <a:solidFill>
+                  <a:srgbClr val="000000"/>
+                </a:solidFill>
+                <a:latin typeface="Arial"/>
+              </a:rPr>
+              <a:t>Seite</a:t>
+            </a:r>
+            <a:r>
+              <a:rPr lang="en-US" sz="2200" spc="-1" dirty="0">
+                <a:solidFill>
+                  <a:srgbClr val="000000"/>
+                </a:solidFill>
+                <a:latin typeface="Arial"/>
+              </a:rPr>
+              <a:t> von Verilog: .latch in BLIF </a:t>
+            </a:r>
+            <a:r>
+              <a:rPr lang="en-US" sz="2200" spc="-1" dirty="0" err="1">
+                <a:solidFill>
+                  <a:srgbClr val="000000"/>
+                </a:solidFill>
+                <a:latin typeface="Arial"/>
+              </a:rPr>
+              <a:t>werden</a:t>
+            </a:r>
+            <a:r>
+              <a:rPr lang="en-US" sz="2200" spc="-1" dirty="0">
+                <a:solidFill>
+                  <a:srgbClr val="000000"/>
+                </a:solidFill>
+                <a:latin typeface="Arial"/>
+              </a:rPr>
+              <a:t> </a:t>
+            </a:r>
+            <a:r>
+              <a:rPr lang="en-US" sz="2200" spc="-1" dirty="0" err="1">
+                <a:solidFill>
+                  <a:srgbClr val="000000"/>
+                </a:solidFill>
+                <a:latin typeface="Arial"/>
+              </a:rPr>
+              <a:t>ohne</a:t>
+            </a:r>
+            <a:r>
+              <a:rPr lang="en-US" sz="2200" spc="-1" dirty="0">
+                <a:solidFill>
+                  <a:srgbClr val="000000"/>
+                </a:solidFill>
+                <a:latin typeface="Arial"/>
+              </a:rPr>
+              <a:t> Reset </a:t>
+            </a:r>
+            <a:r>
+              <a:rPr lang="en-US" sz="2200" spc="-1" dirty="0" err="1">
+                <a:solidFill>
+                  <a:srgbClr val="000000"/>
+                </a:solidFill>
+                <a:latin typeface="Arial"/>
+              </a:rPr>
+              <a:t>Funktion</a:t>
+            </a:r>
+            <a:r>
+              <a:rPr lang="en-US" sz="2200" spc="-1" dirty="0">
+                <a:solidFill>
+                  <a:srgbClr val="000000"/>
+                </a:solidFill>
+                <a:latin typeface="Arial"/>
+              </a:rPr>
+              <a:t> in Verilog </a:t>
+            </a:r>
+            <a:r>
+              <a:rPr lang="en-US" sz="2200" spc="-1" dirty="0" err="1">
+                <a:solidFill>
+                  <a:srgbClr val="000000"/>
+                </a:solidFill>
+                <a:latin typeface="Arial"/>
+              </a:rPr>
+              <a:t>umgewandelt</a:t>
+            </a:r>
+            <a:r>
+              <a:rPr lang="en-US" sz="2200" spc="-1" dirty="0">
+                <a:solidFill>
+                  <a:srgbClr val="000000"/>
+                </a:solidFill>
+                <a:latin typeface="Arial"/>
+              </a:rPr>
+              <a:t>. Dies </a:t>
+            </a:r>
+            <a:r>
+              <a:rPr lang="en-US" sz="2200" spc="-1" dirty="0" err="1">
+                <a:solidFill>
+                  <a:srgbClr val="000000"/>
+                </a:solidFill>
+                <a:latin typeface="Arial"/>
+              </a:rPr>
+              <a:t>werden</a:t>
+            </a:r>
+            <a:r>
+              <a:rPr lang="en-US" sz="2200" spc="-1" dirty="0">
+                <a:solidFill>
+                  <a:srgbClr val="000000"/>
+                </a:solidFill>
+                <a:latin typeface="Arial"/>
+              </a:rPr>
+              <a:t> </a:t>
+            </a:r>
+            <a:r>
+              <a:rPr lang="en-US" sz="2200" spc="-1" dirty="0" err="1">
+                <a:solidFill>
+                  <a:srgbClr val="000000"/>
+                </a:solidFill>
+                <a:latin typeface="Arial"/>
+              </a:rPr>
+              <a:t>zu</a:t>
+            </a:r>
+            <a:r>
+              <a:rPr lang="en-US" sz="2200" spc="-1" dirty="0">
+                <a:solidFill>
+                  <a:srgbClr val="000000"/>
+                </a:solidFill>
+                <a:latin typeface="Arial"/>
+              </a:rPr>
+              <a:t> </a:t>
+            </a:r>
+            <a:r>
+              <a:rPr lang="en-US" sz="2200" spc="-1" dirty="0" err="1">
+                <a:solidFill>
+                  <a:srgbClr val="000000"/>
+                </a:solidFill>
+                <a:latin typeface="Arial"/>
+              </a:rPr>
+              <a:t>einem</a:t>
+            </a:r>
+            <a:r>
+              <a:rPr lang="en-US" sz="2200" spc="-1" dirty="0">
+                <a:solidFill>
+                  <a:srgbClr val="000000"/>
+                </a:solidFill>
+                <a:latin typeface="Arial"/>
+              </a:rPr>
+              <a:t> </a:t>
+            </a:r>
+            <a:r>
+              <a:rPr lang="en-US" sz="2200" spc="-1" dirty="0" err="1">
+                <a:solidFill>
+                  <a:srgbClr val="000000"/>
+                </a:solidFill>
+                <a:latin typeface="Arial"/>
+              </a:rPr>
+              <a:t>Synchronisierungsproblem</a:t>
+            </a:r>
+            <a:r>
+              <a:rPr lang="en-US" sz="2200" spc="-1" dirty="0">
+                <a:solidFill>
+                  <a:srgbClr val="000000"/>
+                </a:solidFill>
+                <a:latin typeface="Arial"/>
+              </a:rPr>
+              <a:t> </a:t>
+            </a:r>
+            <a:r>
+              <a:rPr lang="en-US" sz="2200" spc="-1" dirty="0" err="1">
+                <a:solidFill>
+                  <a:srgbClr val="000000"/>
+                </a:solidFill>
+                <a:latin typeface="Arial"/>
+              </a:rPr>
+              <a:t>führen</a:t>
+            </a:r>
+            <a:r>
+              <a:rPr lang="en-US" sz="2200" spc="-1" dirty="0">
+                <a:solidFill>
+                  <a:srgbClr val="000000"/>
+                </a:solidFill>
+                <a:latin typeface="Arial"/>
+              </a:rPr>
+              <a:t>. Bei der Simulation </a:t>
+            </a:r>
+            <a:r>
+              <a:rPr lang="en-US" sz="2200" spc="-1" dirty="0" err="1">
+                <a:solidFill>
+                  <a:srgbClr val="000000"/>
+                </a:solidFill>
+                <a:latin typeface="Arial"/>
+              </a:rPr>
+              <a:t>habe</a:t>
+            </a:r>
+            <a:r>
+              <a:rPr lang="en-US" sz="2200" spc="-1" dirty="0">
+                <a:solidFill>
+                  <a:srgbClr val="000000"/>
+                </a:solidFill>
+                <a:latin typeface="Arial"/>
+              </a:rPr>
+              <a:t> ich </a:t>
+            </a:r>
+            <a:r>
+              <a:rPr lang="en-US" sz="2200" spc="-1" dirty="0" err="1">
+                <a:solidFill>
+                  <a:srgbClr val="000000"/>
+                </a:solidFill>
+                <a:latin typeface="Arial"/>
+              </a:rPr>
+              <a:t>manuell</a:t>
+            </a:r>
+            <a:r>
+              <a:rPr lang="en-US" sz="2200" spc="-1" dirty="0">
+                <a:solidFill>
+                  <a:srgbClr val="000000"/>
+                </a:solidFill>
+                <a:latin typeface="Arial"/>
+              </a:rPr>
+              <a:t> </a:t>
+            </a:r>
+            <a:r>
+              <a:rPr lang="en-US" sz="2200" spc="-1" dirty="0" err="1">
+                <a:solidFill>
+                  <a:srgbClr val="000000"/>
+                </a:solidFill>
+                <a:latin typeface="Arial"/>
+              </a:rPr>
+              <a:t>modifiziert</a:t>
+            </a:r>
+            <a:r>
+              <a:rPr lang="en-US" sz="2200" spc="-1" dirty="0">
+                <a:solidFill>
+                  <a:srgbClr val="000000"/>
+                </a:solidFill>
+                <a:latin typeface="Arial"/>
+              </a:rPr>
+              <a:t>.</a:t>
+            </a:r>
+          </a:p>
+          <a:p>
+            <a:pPr marL="271440" indent="-271080">
+              <a:lnSpc>
+                <a:spcPct val="150000"/>
+              </a:lnSpc>
+              <a:spcBef>
+                <a:spcPts val="1199"/>
+              </a:spcBef>
+              <a:buSzPct val="100000"/>
+              <a:buBlip>
+                <a:blip r:embed="rId2"/>
+              </a:buBlip>
+            </a:pPr>
+            <a:r>
+              <a:rPr lang="en-US" sz="2200" spc="-1" dirty="0">
+                <a:solidFill>
+                  <a:srgbClr val="000000"/>
+                </a:solidFill>
+                <a:latin typeface="Arial"/>
+              </a:rPr>
+              <a:t>Für die Zukunft</a:t>
+            </a:r>
+          </a:p>
+          <a:p>
+            <a:pPr marL="728640" lvl="1" indent="-271080">
+              <a:lnSpc>
+                <a:spcPct val="150000"/>
+              </a:lnSpc>
+              <a:spcBef>
+                <a:spcPts val="1199"/>
+              </a:spcBef>
+              <a:buSzPct val="100000"/>
+              <a:buBlip>
+                <a:blip r:embed="rId2"/>
+              </a:buBlip>
+            </a:pPr>
+            <a:r>
+              <a:rPr lang="en-US" sz="2200" spc="-1" dirty="0" err="1">
+                <a:solidFill>
+                  <a:srgbClr val="000000"/>
+                </a:solidFill>
+                <a:latin typeface="Arial"/>
+              </a:rPr>
+              <a:t>Aktuelle</a:t>
+            </a:r>
+            <a:r>
+              <a:rPr lang="en-US" sz="2200" spc="-1" dirty="0">
+                <a:solidFill>
+                  <a:srgbClr val="000000"/>
+                </a:solidFill>
+                <a:latin typeface="Arial"/>
+              </a:rPr>
+              <a:t> Modul </a:t>
+            </a:r>
+            <a:r>
+              <a:rPr lang="en-US" sz="2200" spc="-1" dirty="0" err="1">
+                <a:solidFill>
+                  <a:srgbClr val="000000"/>
+                </a:solidFill>
+                <a:latin typeface="Arial"/>
+              </a:rPr>
+              <a:t>ist</a:t>
+            </a:r>
+            <a:r>
+              <a:rPr lang="en-US" sz="2200" spc="-1" dirty="0">
+                <a:solidFill>
+                  <a:srgbClr val="000000"/>
+                </a:solidFill>
+                <a:latin typeface="Arial"/>
+              </a:rPr>
+              <a:t> </a:t>
+            </a:r>
+            <a:r>
+              <a:rPr lang="en-US" sz="2200" spc="-1" dirty="0" err="1">
+                <a:solidFill>
+                  <a:srgbClr val="000000"/>
+                </a:solidFill>
+                <a:latin typeface="Arial"/>
+              </a:rPr>
+              <a:t>noch</a:t>
+            </a:r>
+            <a:r>
+              <a:rPr lang="en-US" sz="2200" spc="-1" dirty="0">
+                <a:solidFill>
+                  <a:srgbClr val="000000"/>
+                </a:solidFill>
+                <a:latin typeface="Arial"/>
+              </a:rPr>
+              <a:t> </a:t>
+            </a:r>
+            <a:r>
+              <a:rPr lang="en-US" sz="2200" spc="-1" dirty="0" err="1">
+                <a:solidFill>
+                  <a:srgbClr val="000000"/>
+                </a:solidFill>
+                <a:latin typeface="Arial"/>
+              </a:rPr>
+              <a:t>zu</a:t>
+            </a:r>
+            <a:r>
+              <a:rPr lang="en-US" sz="2200" spc="-1" dirty="0">
+                <a:solidFill>
+                  <a:srgbClr val="000000"/>
+                </a:solidFill>
+                <a:latin typeface="Arial"/>
+              </a:rPr>
+              <a:t> schnell und </a:t>
+            </a:r>
+            <a:r>
+              <a:rPr lang="en-US" sz="2200" spc="-1" dirty="0" err="1">
+                <a:solidFill>
+                  <a:srgbClr val="000000"/>
+                </a:solidFill>
+                <a:latin typeface="Arial"/>
+              </a:rPr>
+              <a:t>weiter</a:t>
+            </a:r>
+            <a:r>
+              <a:rPr lang="en-US" sz="2200" spc="-1" dirty="0">
+                <a:solidFill>
+                  <a:srgbClr val="000000"/>
+                </a:solidFill>
+                <a:latin typeface="Arial"/>
+              </a:rPr>
+              <a:t> </a:t>
+            </a:r>
+            <a:r>
+              <a:rPr lang="en-US" sz="2200" spc="-1" dirty="0" err="1">
+                <a:solidFill>
+                  <a:srgbClr val="000000"/>
+                </a:solidFill>
+                <a:latin typeface="Arial"/>
+              </a:rPr>
+              <a:t>größere</a:t>
+            </a:r>
+            <a:r>
+              <a:rPr lang="en-US" sz="2200" spc="-1" dirty="0">
+                <a:solidFill>
+                  <a:srgbClr val="000000"/>
+                </a:solidFill>
+                <a:latin typeface="Arial"/>
+              </a:rPr>
+              <a:t> </a:t>
+            </a:r>
+            <a:r>
+              <a:rPr lang="en-US" sz="2200" spc="-1" dirty="0" err="1">
+                <a:solidFill>
+                  <a:srgbClr val="000000"/>
+                </a:solidFill>
+                <a:latin typeface="Arial"/>
+              </a:rPr>
+              <a:t>Menge</a:t>
+            </a:r>
+            <a:r>
+              <a:rPr lang="en-US" sz="2200" spc="-1" dirty="0">
+                <a:solidFill>
+                  <a:srgbClr val="000000"/>
+                </a:solidFill>
+                <a:latin typeface="Arial"/>
+              </a:rPr>
+              <a:t> Code </a:t>
+            </a:r>
+            <a:r>
+              <a:rPr lang="en-US" sz="2200" spc="-1" dirty="0" err="1">
+                <a:solidFill>
+                  <a:srgbClr val="000000"/>
+                </a:solidFill>
+                <a:latin typeface="Arial"/>
+              </a:rPr>
+              <a:t>zu</a:t>
+            </a:r>
+            <a:r>
+              <a:rPr lang="en-US" sz="2200" spc="-1" dirty="0">
+                <a:solidFill>
+                  <a:srgbClr val="000000"/>
+                </a:solidFill>
+                <a:latin typeface="Arial"/>
+              </a:rPr>
+              <a:t> </a:t>
+            </a:r>
+            <a:r>
+              <a:rPr lang="en-US" sz="2200" spc="-1" dirty="0" err="1">
+                <a:solidFill>
+                  <a:srgbClr val="000000"/>
+                </a:solidFill>
+                <a:latin typeface="Arial"/>
+              </a:rPr>
+              <a:t>prüfen</a:t>
+            </a:r>
+            <a:r>
+              <a:rPr lang="en-US" sz="2200" spc="-1" dirty="0">
+                <a:solidFill>
+                  <a:srgbClr val="000000"/>
+                </a:solidFill>
+                <a:latin typeface="Arial"/>
+              </a:rPr>
+              <a:t>.</a:t>
+            </a:r>
+          </a:p>
+          <a:p>
+            <a:pPr marL="728640" lvl="1" indent="-271080">
+              <a:lnSpc>
+                <a:spcPct val="150000"/>
+              </a:lnSpc>
+              <a:spcBef>
+                <a:spcPts val="1199"/>
+              </a:spcBef>
+              <a:buSzPct val="100000"/>
+              <a:buBlip>
+                <a:blip r:embed="rId2"/>
+              </a:buBlip>
+            </a:pPr>
+            <a:r>
+              <a:rPr lang="en-US" sz="2200" spc="-1" dirty="0">
+                <a:solidFill>
+                  <a:srgbClr val="000000"/>
+                </a:solidFill>
+                <a:latin typeface="Arial"/>
+              </a:rPr>
+              <a:t>Das Modul </a:t>
+            </a:r>
+            <a:r>
+              <a:rPr lang="en-US" sz="2200" spc="-1" dirty="0" err="1">
+                <a:solidFill>
+                  <a:srgbClr val="000000"/>
+                </a:solidFill>
+                <a:latin typeface="Arial"/>
+              </a:rPr>
+              <a:t>mit</a:t>
+            </a:r>
+            <a:r>
+              <a:rPr lang="en-US" sz="2200" spc="-1" dirty="0">
+                <a:solidFill>
+                  <a:srgbClr val="000000"/>
+                </a:solidFill>
+                <a:latin typeface="Arial"/>
+              </a:rPr>
+              <a:t> </a:t>
+            </a:r>
+            <a:r>
+              <a:rPr lang="en-US" sz="2200" spc="-1" dirty="0" err="1">
+                <a:solidFill>
+                  <a:srgbClr val="000000"/>
+                </a:solidFill>
+                <a:latin typeface="Arial"/>
+              </a:rPr>
+              <a:t>mehrere</a:t>
+            </a:r>
+            <a:r>
+              <a:rPr lang="en-US" sz="2200" spc="-1" dirty="0">
+                <a:solidFill>
+                  <a:srgbClr val="000000"/>
+                </a:solidFill>
+                <a:latin typeface="Arial"/>
+              </a:rPr>
+              <a:t> </a:t>
+            </a:r>
+            <a:r>
+              <a:rPr lang="en-US" sz="2200" spc="-1" dirty="0" err="1">
+                <a:solidFill>
+                  <a:srgbClr val="000000"/>
+                </a:solidFill>
+                <a:latin typeface="Arial"/>
+              </a:rPr>
+              <a:t>Teilmodule</a:t>
+            </a:r>
+            <a:r>
+              <a:rPr lang="en-US" sz="2200" spc="-1" dirty="0">
+                <a:solidFill>
+                  <a:srgbClr val="000000"/>
+                </a:solidFill>
+                <a:latin typeface="Arial"/>
+              </a:rPr>
+              <a:t> </a:t>
+            </a:r>
+            <a:r>
+              <a:rPr lang="en-US" sz="2200" spc="-1" dirty="0" err="1">
+                <a:solidFill>
+                  <a:srgbClr val="000000"/>
+                </a:solidFill>
+                <a:latin typeface="Arial"/>
+              </a:rPr>
+              <a:t>mit</a:t>
+            </a:r>
+            <a:r>
+              <a:rPr lang="en-US" sz="2200" spc="-1" dirty="0">
+                <a:solidFill>
+                  <a:srgbClr val="000000"/>
+                </a:solidFill>
+                <a:latin typeface="Arial"/>
+              </a:rPr>
+              <a:t> </a:t>
+            </a:r>
+            <a:r>
+              <a:rPr lang="en-US" sz="2200" spc="-1" dirty="0" err="1">
+                <a:solidFill>
+                  <a:srgbClr val="000000"/>
+                </a:solidFill>
+                <a:latin typeface="Arial"/>
+              </a:rPr>
+              <a:t>dieser</a:t>
+            </a:r>
+            <a:r>
+              <a:rPr lang="en-US" sz="2200" spc="-1" dirty="0">
+                <a:solidFill>
+                  <a:srgbClr val="000000"/>
+                </a:solidFill>
+                <a:latin typeface="Arial"/>
+              </a:rPr>
+              <a:t> </a:t>
+            </a:r>
+            <a:r>
+              <a:rPr lang="en-US" sz="2200" spc="-1" dirty="0" err="1">
+                <a:solidFill>
+                  <a:srgbClr val="000000"/>
+                </a:solidFill>
+                <a:latin typeface="Arial"/>
+              </a:rPr>
+              <a:t>Prozess</a:t>
+            </a:r>
+            <a:r>
+              <a:rPr lang="en-US" sz="2200" spc="-1" dirty="0">
+                <a:solidFill>
+                  <a:srgbClr val="000000"/>
+                </a:solidFill>
+                <a:latin typeface="Arial"/>
+              </a:rPr>
+              <a:t> </a:t>
+            </a:r>
+            <a:r>
+              <a:rPr lang="en-US" sz="2200" spc="-1" dirty="0" err="1">
+                <a:solidFill>
+                  <a:srgbClr val="000000"/>
+                </a:solidFill>
+                <a:latin typeface="Arial"/>
+              </a:rPr>
+              <a:t>zu</a:t>
+            </a:r>
+            <a:r>
+              <a:rPr lang="en-US" sz="2200" spc="-1" dirty="0">
+                <a:solidFill>
+                  <a:srgbClr val="000000"/>
+                </a:solidFill>
+                <a:latin typeface="Arial"/>
+              </a:rPr>
+              <a:t> </a:t>
+            </a:r>
+            <a:r>
+              <a:rPr lang="en-US" sz="2200" spc="-1" dirty="0" err="1">
+                <a:solidFill>
+                  <a:srgbClr val="000000"/>
+                </a:solidFill>
+                <a:latin typeface="Arial"/>
+              </a:rPr>
+              <a:t>prüfen</a:t>
+            </a:r>
+            <a:r>
+              <a:rPr lang="en-US" sz="2200" spc="-1" dirty="0">
+                <a:solidFill>
+                  <a:srgbClr val="000000"/>
+                </a:solidFill>
+                <a:latin typeface="Arial"/>
+              </a:rPr>
+              <a:t>.</a:t>
+            </a:r>
+          </a:p>
+          <a:p>
+            <a:pPr marL="728640" lvl="1" indent="-271080">
+              <a:lnSpc>
+                <a:spcPct val="150000"/>
+              </a:lnSpc>
+              <a:spcBef>
+                <a:spcPts val="1199"/>
+              </a:spcBef>
+              <a:buSzPct val="100000"/>
+              <a:buBlip>
+                <a:blip r:embed="rId2"/>
+              </a:buBlip>
+            </a:pPr>
+            <a:r>
+              <a:rPr lang="en-US" sz="2200" spc="-1" dirty="0" err="1">
+                <a:solidFill>
+                  <a:srgbClr val="000000"/>
+                </a:solidFill>
+                <a:latin typeface="Arial"/>
+              </a:rPr>
+              <a:t>Wenn</a:t>
+            </a:r>
+            <a:r>
+              <a:rPr lang="en-US" sz="2200" spc="-1" dirty="0">
+                <a:solidFill>
+                  <a:srgbClr val="000000"/>
+                </a:solidFill>
+                <a:latin typeface="Arial"/>
+              </a:rPr>
+              <a:t> </a:t>
+            </a:r>
+            <a:r>
+              <a:rPr lang="en-US" sz="2200" spc="-1" dirty="0" err="1">
+                <a:solidFill>
+                  <a:srgbClr val="000000"/>
+                </a:solidFill>
+                <a:latin typeface="Arial"/>
+              </a:rPr>
+              <a:t>alles</a:t>
+            </a:r>
+            <a:r>
+              <a:rPr lang="en-US" sz="2200" spc="-1" dirty="0">
+                <a:solidFill>
+                  <a:srgbClr val="000000"/>
+                </a:solidFill>
+                <a:latin typeface="Arial"/>
+              </a:rPr>
+              <a:t> </a:t>
+            </a:r>
+            <a:r>
+              <a:rPr lang="en-US" sz="2200" spc="-1" dirty="0" err="1">
+                <a:solidFill>
+                  <a:srgbClr val="000000"/>
+                </a:solidFill>
+                <a:latin typeface="Arial"/>
+              </a:rPr>
+              <a:t>passt</a:t>
+            </a:r>
+            <a:r>
+              <a:rPr lang="en-US" sz="2200" spc="-1" dirty="0">
+                <a:solidFill>
+                  <a:srgbClr val="000000"/>
+                </a:solidFill>
+                <a:latin typeface="Arial"/>
+              </a:rPr>
+              <a:t> </a:t>
+            </a:r>
+            <a:r>
+              <a:rPr lang="en-US" sz="2200" spc="-1" dirty="0" err="1">
+                <a:solidFill>
+                  <a:srgbClr val="000000"/>
+                </a:solidFill>
+                <a:latin typeface="Arial"/>
+              </a:rPr>
+              <a:t>ist</a:t>
+            </a:r>
+            <a:r>
+              <a:rPr lang="en-US" sz="2200" spc="-1" dirty="0">
+                <a:solidFill>
+                  <a:srgbClr val="000000"/>
+                </a:solidFill>
+                <a:latin typeface="Arial"/>
+              </a:rPr>
+              <a:t>, </a:t>
+            </a:r>
+            <a:r>
+              <a:rPr lang="en-US" sz="2200" spc="-1" dirty="0" err="1">
+                <a:solidFill>
+                  <a:srgbClr val="000000"/>
+                </a:solidFill>
+                <a:latin typeface="Arial"/>
+              </a:rPr>
+              <a:t>können</a:t>
+            </a:r>
+            <a:r>
+              <a:rPr lang="en-US" sz="2200" spc="-1" dirty="0">
+                <a:solidFill>
+                  <a:srgbClr val="000000"/>
+                </a:solidFill>
+                <a:latin typeface="Arial"/>
+              </a:rPr>
+              <a:t> </a:t>
+            </a:r>
+            <a:r>
+              <a:rPr lang="en-US" sz="2200" spc="-1" dirty="0" err="1">
+                <a:solidFill>
+                  <a:srgbClr val="000000"/>
+                </a:solidFill>
+                <a:latin typeface="Arial"/>
+              </a:rPr>
+              <a:t>wir</a:t>
+            </a:r>
+            <a:r>
+              <a:rPr lang="en-US" sz="2200" spc="-1" dirty="0">
+                <a:solidFill>
+                  <a:srgbClr val="000000"/>
+                </a:solidFill>
+                <a:latin typeface="Arial"/>
+              </a:rPr>
+              <a:t> das </a:t>
+            </a:r>
+            <a:r>
+              <a:rPr lang="en-US" sz="2200" spc="-1" dirty="0" err="1">
+                <a:solidFill>
+                  <a:srgbClr val="000000"/>
+                </a:solidFill>
+                <a:latin typeface="Arial"/>
+              </a:rPr>
+              <a:t>Ersetzungsalgorithmus</a:t>
+            </a:r>
+            <a:r>
+              <a:rPr lang="en-US" sz="2200" spc="-1" dirty="0">
+                <a:solidFill>
+                  <a:srgbClr val="000000"/>
+                </a:solidFill>
+                <a:latin typeface="Arial"/>
+              </a:rPr>
+              <a:t> </a:t>
+            </a:r>
+            <a:r>
+              <a:rPr lang="en-US" sz="2200" spc="-1" dirty="0" err="1">
+                <a:solidFill>
+                  <a:srgbClr val="000000"/>
+                </a:solidFill>
+                <a:latin typeface="Arial"/>
+              </a:rPr>
+              <a:t>anfangen</a:t>
+            </a:r>
+            <a:r>
+              <a:rPr lang="en-US" sz="2200" spc="-1">
+                <a:solidFill>
+                  <a:srgbClr val="000000"/>
+                </a:solidFill>
+                <a:latin typeface="Arial"/>
+              </a:rPr>
+              <a:t>.</a:t>
+            </a:r>
+            <a:endParaRPr lang="en-US" sz="2200" spc="-1" dirty="0">
+              <a:solidFill>
+                <a:srgbClr val="000000"/>
+              </a:solidFill>
+              <a:latin typeface="Arial"/>
+            </a:endParaRPr>
+          </a:p>
+          <a:p>
+            <a:pPr marL="728640" lvl="1" indent="-271080">
+              <a:lnSpc>
+                <a:spcPct val="150000"/>
+              </a:lnSpc>
+              <a:spcBef>
+                <a:spcPts val="1199"/>
+              </a:spcBef>
+              <a:buSzPct val="100000"/>
+              <a:buBlip>
+                <a:blip r:embed="rId2"/>
+              </a:buBlip>
+            </a:pPr>
+            <a:endParaRPr lang="en-US" sz="2200" spc="-1" dirty="0">
+              <a:solidFill>
+                <a:srgbClr val="000000"/>
+              </a:solidFill>
+              <a:latin typeface="Arial"/>
+            </a:endParaRPr>
+          </a:p>
+        </p:txBody>
+      </p:sp>
+    </p:spTree>
+    <p:extLst>
+      <p:ext uri="{BB962C8B-B14F-4D97-AF65-F5344CB8AC3E}">
+        <p14:creationId xmlns:p14="http://schemas.microsoft.com/office/powerpoint/2010/main" val="2878771837"/>
       </p:ext>
     </p:extLst>
   </p:cSld>

</xml_diff>